<commit_message>
removed confusing picture of plugin creation wizard with wrong contents
</commit_message>
<xml_diff>
--- a/Documentation/AsTeRICS Plugin Development.pptx
+++ b/Documentation/AsTeRICS Plugin Development.pptx
@@ -306,7 +306,7 @@
               <a:pPr>
                 <a:defRPr/>
               </a:pPr>
-              <a:t>26.04.2018</a:t>
+              <a:t>30.04.2018</a:t>
             </a:fld>
             <a:endParaRPr lang="de-AT"/>
           </a:p>
@@ -7161,12 +7161,8 @@
           </a:p>
           <a:p>
             <a:r>
-              <a:rPr lang="de-AT" dirty="0" err="1"/>
-              <a:t>Generate</a:t>
-            </a:r>
-            <a:r>
-              <a:rPr lang="de-AT" dirty="0"/>
-              <a:t> </a:t>
+              <a:rPr lang="de-AT" dirty="0"/>
+              <a:t>Generate </a:t>
             </a:r>
             <a:r>
               <a:rPr lang="de-AT" dirty="0" err="1"/>
@@ -7206,15 +7202,7 @@
             </a:r>
             <a:r>
               <a:rPr lang="de-AT" dirty="0"/>
-              <a:t> </a:t>
-            </a:r>
-            <a:r>
-              <a:rPr lang="de-AT" dirty="0" err="1"/>
-              <a:t>and</a:t>
-            </a:r>
-            <a:r>
-              <a:rPr lang="de-AT" dirty="0"/>
-              <a:t> </a:t>
+              <a:t> and </a:t>
             </a:r>
             <a:r>
               <a:rPr lang="de-AT" dirty="0" err="1"/>
@@ -7227,6 +7215,20 @@
             <a:r>
               <a:rPr lang="de-AT" dirty="0" err="1"/>
               <a:t>script</a:t>
+            </a:r>
+            <a:endParaRPr lang="de-AT" dirty="0"/>
+          </a:p>
+          <a:p>
+            <a:endParaRPr lang="de-AT" dirty="0"/>
+          </a:p>
+          <a:p>
+            <a:r>
+              <a:rPr lang="de-AT" dirty="0" err="1"/>
+              <a:t>Finally</a:t>
+            </a:r>
+            <a:r>
+              <a:rPr lang="de-AT" dirty="0"/>
+              <a:t> „CREATE PLUGIN“</a:t>
             </a:r>
             <a:endParaRPr lang="en-US" dirty="0"/>
           </a:p>
@@ -7300,60 +7302,6 @@
           </a:p>
         </p:txBody>
       </p:sp>
-      <p:pic>
-        <p:nvPicPr>
-          <p:cNvPr id="2050" name="Grafik 1"/>
-          <p:cNvPicPr>
-            <a:picLocks noChangeAspect="1" noChangeArrowheads="1"/>
-          </p:cNvPicPr>
-          <p:nvPr/>
-        </p:nvPicPr>
-        <p:blipFill>
-          <a:blip r:embed="rId2">
-            <a:extLst>
-              <a:ext uri="{28A0092B-C50C-407E-A947-70E740481C1C}">
-                <a14:useLocalDpi xmlns:a14="http://schemas.microsoft.com/office/drawing/2010/main" val="0"/>
-              </a:ext>
-            </a:extLst>
-          </a:blip>
-          <a:srcRect/>
-          <a:stretch>
-            <a:fillRect/>
-          </a:stretch>
-        </p:blipFill>
-        <p:spPr bwMode="auto">
-          <a:xfrm>
-            <a:off x="1674007" y="2132856"/>
-            <a:ext cx="5795987" cy="4054420"/>
-          </a:xfrm>
-          <a:prstGeom prst="rect">
-            <a:avLst/>
-          </a:prstGeom>
-          <a:noFill/>
-          <a:ln>
-            <a:noFill/>
-          </a:ln>
-          <a:extLst>
-            <a:ext uri="{909E8E84-426E-40DD-AFC4-6F175D3DCCD1}">
-              <a14:hiddenFill xmlns:a14="http://schemas.microsoft.com/office/drawing/2010/main">
-                <a:solidFill>
-                  <a:srgbClr val="FFFFFF"/>
-                </a:solidFill>
-              </a14:hiddenFill>
-            </a:ext>
-            <a:ext uri="{91240B29-F687-4F45-9708-019B960494DF}">
-              <a14:hiddenLine xmlns:a14="http://schemas.microsoft.com/office/drawing/2010/main" w="9525">
-                <a:solidFill>
-                  <a:srgbClr val="000000"/>
-                </a:solidFill>
-                <a:miter lim="800000"/>
-                <a:headEnd/>
-                <a:tailEnd/>
-              </a14:hiddenLine>
-            </a:ext>
-          </a:extLst>
-        </p:spPr>
-      </p:pic>
     </p:spTree>
     <p:extLst>
       <p:ext uri="{BB962C8B-B14F-4D97-AF65-F5344CB8AC3E}">
@@ -7623,6 +7571,14 @@
             </a:r>
             <a:r>
               <a:rPr lang="de-AT" dirty="0" err="1"/>
+              <a:t>git</a:t>
+            </a:r>
+            <a:r>
+              <a:rPr lang="de-AT" dirty="0"/>
+              <a:t> </a:t>
+            </a:r>
+            <a:r>
+              <a:rPr lang="de-AT" dirty="0" err="1"/>
               <a:t>target</a:t>
             </a:r>
             <a:r>
@@ -7644,19 +7600,7 @@
               <a:rPr lang="de-AT" dirty="0">
                 <a:latin typeface="Source Code Pro" panose="020B0509030403020204" pitchFamily="49" charset="0"/>
               </a:rPr>
-              <a:t>&lt;</a:t>
-            </a:r>
-            <a:r>
-              <a:rPr lang="de-AT" dirty="0" err="1">
-                <a:latin typeface="Source Code Pro" panose="020B0509030403020204" pitchFamily="49" charset="0"/>
-              </a:rPr>
-              <a:t>AsTeRICS</a:t>
-            </a:r>
-            <a:r>
-              <a:rPr lang="de-AT" dirty="0">
-                <a:latin typeface="Source Code Pro" panose="020B0509030403020204" pitchFamily="49" charset="0"/>
-              </a:rPr>
-              <a:t> ROOT&gt;/ARE/</a:t>
+              <a:t>&lt;AsTeRICS ROOT&gt;/ARE/</a:t>
             </a:r>
             <a:r>
               <a:rPr lang="de-AT" dirty="0" err="1">
@@ -7792,6 +7736,50 @@
           </a:extLst>
         </p:spPr>
       </p:pic>
+      <p:cxnSp>
+        <p:nvCxnSpPr>
+          <p:cNvPr id="7" name="Gerade Verbindung mit Pfeil 6">
+            <a:extLst>
+              <a:ext uri="{FF2B5EF4-FFF2-40B4-BE49-F238E27FC236}">
+                <a16:creationId xmlns:a16="http://schemas.microsoft.com/office/drawing/2014/main" id="{969D36B5-FE4B-4460-AF70-9FB62EBA0C33}"/>
+              </a:ext>
+            </a:extLst>
+          </p:cNvPr>
+          <p:cNvCxnSpPr>
+            <a:cxnSpLocks/>
+          </p:cNvCxnSpPr>
+          <p:nvPr/>
+        </p:nvCxnSpPr>
+        <p:spPr>
+          <a:xfrm>
+            <a:off x="6228184" y="4293096"/>
+            <a:ext cx="791492" cy="624852"/>
+          </a:xfrm>
+          <a:prstGeom prst="straightConnector1">
+            <a:avLst/>
+          </a:prstGeom>
+          <a:ln w="28575">
+            <a:solidFill>
+              <a:srgbClr val="FF0000"/>
+            </a:solidFill>
+            <a:tailEnd type="triangle"/>
+          </a:ln>
+        </p:spPr>
+        <p:style>
+          <a:lnRef idx="1">
+            <a:schemeClr val="dk1"/>
+          </a:lnRef>
+          <a:fillRef idx="0">
+            <a:schemeClr val="dk1"/>
+          </a:fillRef>
+          <a:effectRef idx="0">
+            <a:schemeClr val="dk1"/>
+          </a:effectRef>
+          <a:fontRef idx="minor">
+            <a:schemeClr val="tx1"/>
+          </a:fontRef>
+        </p:style>
+      </p:cxnSp>
     </p:spTree>
     <p:extLst>
       <p:ext uri="{BB962C8B-B14F-4D97-AF65-F5344CB8AC3E}">

</xml_diff>